<commit_message>
now with deterministic only
</commit_message>
<xml_diff>
--- a/shapesPPT.pptx
+++ b/shapesPPT.pptx
@@ -6,6 +6,7 @@
   </p:sldMasterIdLst>
   <p:sldIdLst>
     <p:sldId id="256" r:id="rId2"/>
+    <p:sldId id="257" r:id="rId3"/>
   </p:sldIdLst>
   <p:sldSz cx="9144000" cy="6858000" type="screen4x3"/>
   <p:notesSz cx="6858000" cy="9144000"/>
@@ -288,7 +289,7 @@
           <a:p>
             <a:fld id="{BB917082-3CD7-4EEA-BF8B-7FD365FE636A}" type="datetimeFigureOut">
               <a:rPr lang="en-US" smtClean="0"/>
-              <a:t>1/21/2016</a:t>
+              <a:t>1/23/16</a:t>
             </a:fld>
             <a:endParaRPr lang="en-US"/>
           </a:p>
@@ -458,7 +459,7 @@
           <a:p>
             <a:fld id="{BB917082-3CD7-4EEA-BF8B-7FD365FE636A}" type="datetimeFigureOut">
               <a:rPr lang="en-US" smtClean="0"/>
-              <a:t>1/21/2016</a:t>
+              <a:t>1/23/16</a:t>
             </a:fld>
             <a:endParaRPr lang="en-US"/>
           </a:p>
@@ -638,7 +639,7 @@
           <a:p>
             <a:fld id="{BB917082-3CD7-4EEA-BF8B-7FD365FE636A}" type="datetimeFigureOut">
               <a:rPr lang="en-US" smtClean="0"/>
-              <a:t>1/21/2016</a:t>
+              <a:t>1/23/16</a:t>
             </a:fld>
             <a:endParaRPr lang="en-US"/>
           </a:p>
@@ -808,7 +809,7 @@
           <a:p>
             <a:fld id="{BB917082-3CD7-4EEA-BF8B-7FD365FE636A}" type="datetimeFigureOut">
               <a:rPr lang="en-US" smtClean="0"/>
-              <a:t>1/21/2016</a:t>
+              <a:t>1/23/16</a:t>
             </a:fld>
             <a:endParaRPr lang="en-US"/>
           </a:p>
@@ -1054,7 +1055,7 @@
           <a:p>
             <a:fld id="{BB917082-3CD7-4EEA-BF8B-7FD365FE636A}" type="datetimeFigureOut">
               <a:rPr lang="en-US" smtClean="0"/>
-              <a:t>1/21/2016</a:t>
+              <a:t>1/23/16</a:t>
             </a:fld>
             <a:endParaRPr lang="en-US"/>
           </a:p>
@@ -1342,7 +1343,7 @@
           <a:p>
             <a:fld id="{BB917082-3CD7-4EEA-BF8B-7FD365FE636A}" type="datetimeFigureOut">
               <a:rPr lang="en-US" smtClean="0"/>
-              <a:t>1/21/2016</a:t>
+              <a:t>1/23/16</a:t>
             </a:fld>
             <a:endParaRPr lang="en-US"/>
           </a:p>
@@ -1764,7 +1765,7 @@
           <a:p>
             <a:fld id="{BB917082-3CD7-4EEA-BF8B-7FD365FE636A}" type="datetimeFigureOut">
               <a:rPr lang="en-US" smtClean="0"/>
-              <a:t>1/21/2016</a:t>
+              <a:t>1/23/16</a:t>
             </a:fld>
             <a:endParaRPr lang="en-US"/>
           </a:p>
@@ -1882,7 +1883,7 @@
           <a:p>
             <a:fld id="{BB917082-3CD7-4EEA-BF8B-7FD365FE636A}" type="datetimeFigureOut">
               <a:rPr lang="en-US" smtClean="0"/>
-              <a:t>1/21/2016</a:t>
+              <a:t>1/23/16</a:t>
             </a:fld>
             <a:endParaRPr lang="en-US"/>
           </a:p>
@@ -1977,7 +1978,7 @@
           <a:p>
             <a:fld id="{BB917082-3CD7-4EEA-BF8B-7FD365FE636A}" type="datetimeFigureOut">
               <a:rPr lang="en-US" smtClean="0"/>
-              <a:t>1/21/2016</a:t>
+              <a:t>1/23/16</a:t>
             </a:fld>
             <a:endParaRPr lang="en-US"/>
           </a:p>
@@ -2254,7 +2255,7 @@
           <a:p>
             <a:fld id="{BB917082-3CD7-4EEA-BF8B-7FD365FE636A}" type="datetimeFigureOut">
               <a:rPr lang="en-US" smtClean="0"/>
-              <a:t>1/21/2016</a:t>
+              <a:t>1/23/16</a:t>
             </a:fld>
             <a:endParaRPr lang="en-US"/>
           </a:p>
@@ -2507,7 +2508,7 @@
           <a:p>
             <a:fld id="{BB917082-3CD7-4EEA-BF8B-7FD365FE636A}" type="datetimeFigureOut">
               <a:rPr lang="en-US" smtClean="0"/>
-              <a:t>1/21/2016</a:t>
+              <a:t>1/23/16</a:t>
             </a:fld>
             <a:endParaRPr lang="en-US"/>
           </a:p>
@@ -2720,7 +2721,7 @@
           <a:p>
             <a:fld id="{BB917082-3CD7-4EEA-BF8B-7FD365FE636A}" type="datetimeFigureOut">
               <a:rPr lang="en-US" smtClean="0"/>
-              <a:t>1/21/2016</a:t>
+              <a:t>1/23/16</a:t>
             </a:fld>
             <a:endParaRPr lang="en-US"/>
           </a:p>
@@ -4166,6 +4167,604 @@
     <p:extLst>
       <p:ext uri="{BB962C8B-B14F-4D97-AF65-F5344CB8AC3E}">
         <p14:creationId xmlns:p14="http://schemas.microsoft.com/office/powerpoint/2010/main" val="3909583351"/>
+      </p:ext>
+    </p:extLst>
+  </p:cSld>
+  <p:clrMapOvr>
+    <a:masterClrMapping/>
+  </p:clrMapOvr>
+</p:sld>
+</file>
+
+<file path=ppt/slides/slide2.xml><?xml version="1.0" encoding="utf-8"?>
+<p:sld xmlns:a="http://schemas.openxmlformats.org/drawingml/2006/main" xmlns:r="http://schemas.openxmlformats.org/officeDocument/2006/relationships" xmlns:p="http://schemas.openxmlformats.org/presentationml/2006/main">
+  <p:cSld>
+    <p:bg>
+      <p:bgPr>
+        <a:solidFill>
+          <a:schemeClr val="bg1">
+            <a:alpha val="0"/>
+          </a:schemeClr>
+        </a:solidFill>
+        <a:effectLst/>
+      </p:bgPr>
+    </p:bg>
+    <p:spTree>
+      <p:nvGrpSpPr>
+        <p:cNvPr id="1" name=""/>
+        <p:cNvGrpSpPr/>
+        <p:nvPr/>
+      </p:nvGrpSpPr>
+      <p:grpSpPr>
+        <a:xfrm>
+          <a:off x="0" y="0"/>
+          <a:ext cx="0" cy="0"/>
+          <a:chOff x="0" y="0"/>
+          <a:chExt cx="0" cy="0"/>
+        </a:xfrm>
+      </p:grpSpPr>
+      <p:sp>
+        <p:nvSpPr>
+          <p:cNvPr id="4" name="Oval 3"/>
+          <p:cNvSpPr/>
+          <p:nvPr/>
+        </p:nvSpPr>
+        <p:spPr>
+          <a:xfrm>
+            <a:off x="5867400" y="1447800"/>
+            <a:ext cx="914400" cy="838200"/>
+          </a:xfrm>
+          <a:prstGeom prst="ellipse">
+            <a:avLst/>
+          </a:prstGeom>
+          <a:solidFill>
+            <a:srgbClr val="FF0080"/>
+          </a:solidFill>
+          <a:ln>
+            <a:solidFill>
+              <a:schemeClr val="tx1"/>
+            </a:solidFill>
+          </a:ln>
+        </p:spPr>
+        <p:style>
+          <a:lnRef idx="2">
+            <a:schemeClr val="accent1">
+              <a:shade val="50000"/>
+            </a:schemeClr>
+          </a:lnRef>
+          <a:fillRef idx="1">
+            <a:schemeClr val="accent1"/>
+          </a:fillRef>
+          <a:effectRef idx="0">
+            <a:schemeClr val="accent1"/>
+          </a:effectRef>
+          <a:fontRef idx="minor">
+            <a:schemeClr val="lt1"/>
+          </a:fontRef>
+        </p:style>
+        <p:txBody>
+          <a:bodyPr rtlCol="0" anchor="ctr"/>
+          <a:lstStyle/>
+          <a:p>
+            <a:pPr algn="ctr"/>
+            <a:endParaRPr lang="en-US"/>
+          </a:p>
+        </p:txBody>
+      </p:sp>
+      <p:sp>
+        <p:nvSpPr>
+          <p:cNvPr id="5" name="8-Point Star 4"/>
+          <p:cNvSpPr>
+            <a:spLocks/>
+          </p:cNvSpPr>
+          <p:nvPr/>
+        </p:nvSpPr>
+        <p:spPr>
+          <a:xfrm>
+            <a:off x="5867400" y="2667000"/>
+            <a:ext cx="990600" cy="1752600"/>
+          </a:xfrm>
+          <a:prstGeom prst="star8">
+            <a:avLst/>
+          </a:prstGeom>
+          <a:solidFill>
+            <a:srgbClr val="FFFF00"/>
+          </a:solidFill>
+          <a:ln>
+            <a:solidFill>
+              <a:schemeClr val="tx1"/>
+            </a:solidFill>
+          </a:ln>
+        </p:spPr>
+        <p:style>
+          <a:lnRef idx="2">
+            <a:schemeClr val="accent1">
+              <a:shade val="50000"/>
+            </a:schemeClr>
+          </a:lnRef>
+          <a:fillRef idx="1">
+            <a:schemeClr val="accent1"/>
+          </a:fillRef>
+          <a:effectRef idx="0">
+            <a:schemeClr val="accent1"/>
+          </a:effectRef>
+          <a:fontRef idx="minor">
+            <a:schemeClr val="lt1"/>
+          </a:fontRef>
+        </p:style>
+        <p:txBody>
+          <a:bodyPr/>
+          <a:lstStyle/>
+          <a:p>
+            <a:endParaRPr lang="en-US"/>
+          </a:p>
+        </p:txBody>
+      </p:sp>
+      <p:sp>
+        <p:nvSpPr>
+          <p:cNvPr id="6" name="Moon 5"/>
+          <p:cNvSpPr/>
+          <p:nvPr/>
+        </p:nvSpPr>
+        <p:spPr>
+          <a:xfrm rot="19347683">
+            <a:off x="7472102" y="2403555"/>
+            <a:ext cx="573624" cy="685835"/>
+          </a:xfrm>
+          <a:prstGeom prst="moon">
+            <a:avLst>
+              <a:gd name="adj" fmla="val 68038"/>
+            </a:avLst>
+          </a:prstGeom>
+          <a:solidFill>
+            <a:srgbClr val="FF0000"/>
+          </a:solidFill>
+          <a:ln>
+            <a:solidFill>
+              <a:schemeClr val="tx1"/>
+            </a:solidFill>
+          </a:ln>
+        </p:spPr>
+        <p:style>
+          <a:lnRef idx="2">
+            <a:schemeClr val="accent1">
+              <a:shade val="50000"/>
+            </a:schemeClr>
+          </a:lnRef>
+          <a:fillRef idx="1">
+            <a:schemeClr val="accent1"/>
+          </a:fillRef>
+          <a:effectRef idx="0">
+            <a:schemeClr val="accent1"/>
+          </a:effectRef>
+          <a:fontRef idx="minor">
+            <a:schemeClr val="lt1"/>
+          </a:fontRef>
+        </p:style>
+        <p:txBody>
+          <a:bodyPr/>
+          <a:lstStyle/>
+          <a:p>
+            <a:endParaRPr lang="en-US"/>
+          </a:p>
+        </p:txBody>
+      </p:sp>
+      <p:sp>
+        <p:nvSpPr>
+          <p:cNvPr id="7" name="Heart 6"/>
+          <p:cNvSpPr/>
+          <p:nvPr/>
+        </p:nvSpPr>
+        <p:spPr>
+          <a:xfrm rot="10800000">
+            <a:off x="6553200" y="5029200"/>
+            <a:ext cx="685800" cy="457200"/>
+          </a:xfrm>
+          <a:prstGeom prst="heart">
+            <a:avLst/>
+          </a:prstGeom>
+          <a:solidFill>
+            <a:srgbClr val="702EF9"/>
+          </a:solidFill>
+          <a:ln>
+            <a:solidFill>
+              <a:schemeClr val="tx1"/>
+            </a:solidFill>
+          </a:ln>
+        </p:spPr>
+        <p:style>
+          <a:lnRef idx="2">
+            <a:schemeClr val="accent1">
+              <a:shade val="50000"/>
+            </a:schemeClr>
+          </a:lnRef>
+          <a:fillRef idx="1">
+            <a:schemeClr val="accent1"/>
+          </a:fillRef>
+          <a:effectRef idx="0">
+            <a:schemeClr val="accent1"/>
+          </a:effectRef>
+          <a:fontRef idx="minor">
+            <a:schemeClr val="lt1"/>
+          </a:fontRef>
+        </p:style>
+        <p:txBody>
+          <a:bodyPr/>
+          <a:lstStyle/>
+          <a:p>
+            <a:endParaRPr lang="en-US"/>
+          </a:p>
+        </p:txBody>
+      </p:sp>
+      <p:sp>
+        <p:nvSpPr>
+          <p:cNvPr id="8" name="Chevron 7"/>
+          <p:cNvSpPr/>
+          <p:nvPr/>
+        </p:nvSpPr>
+        <p:spPr>
+          <a:xfrm rot="5400000">
+            <a:off x="4922672" y="4221328"/>
+            <a:ext cx="553880" cy="645624"/>
+          </a:xfrm>
+          <a:prstGeom prst="chevron">
+            <a:avLst>
+              <a:gd name="adj" fmla="val 33584"/>
+            </a:avLst>
+          </a:prstGeom>
+          <a:solidFill>
+            <a:srgbClr val="66FFFF"/>
+          </a:solidFill>
+          <a:ln>
+            <a:solidFill>
+              <a:schemeClr val="tx1"/>
+            </a:solidFill>
+          </a:ln>
+        </p:spPr>
+        <p:style>
+          <a:lnRef idx="2">
+            <a:schemeClr val="accent1">
+              <a:shade val="50000"/>
+            </a:schemeClr>
+          </a:lnRef>
+          <a:fillRef idx="1">
+            <a:schemeClr val="accent1"/>
+          </a:fillRef>
+          <a:effectRef idx="0">
+            <a:schemeClr val="accent1"/>
+          </a:effectRef>
+          <a:fontRef idx="minor">
+            <a:schemeClr val="lt1"/>
+          </a:fontRef>
+        </p:style>
+        <p:txBody>
+          <a:bodyPr/>
+          <a:lstStyle/>
+          <a:p>
+            <a:endParaRPr lang="en-US"/>
+          </a:p>
+        </p:txBody>
+      </p:sp>
+      <p:sp>
+        <p:nvSpPr>
+          <p:cNvPr id="9" name="Teardrop 8"/>
+          <p:cNvSpPr>
+            <a:spLocks noChangeAspect="1"/>
+          </p:cNvSpPr>
+          <p:nvPr/>
+        </p:nvSpPr>
+        <p:spPr>
+          <a:xfrm rot="18899893">
+            <a:off x="7442601" y="3669960"/>
+            <a:ext cx="242313" cy="245188"/>
+          </a:xfrm>
+          <a:prstGeom prst="teardrop">
+            <a:avLst>
+              <a:gd name="adj" fmla="val 109386"/>
+            </a:avLst>
+          </a:prstGeom>
+          <a:solidFill>
+            <a:schemeClr val="bg1">
+              <a:lumMod val="75000"/>
+            </a:schemeClr>
+          </a:solidFill>
+          <a:ln>
+            <a:solidFill>
+              <a:schemeClr val="tx1"/>
+            </a:solidFill>
+          </a:ln>
+        </p:spPr>
+        <p:style>
+          <a:lnRef idx="2">
+            <a:schemeClr val="accent1">
+              <a:shade val="50000"/>
+            </a:schemeClr>
+          </a:lnRef>
+          <a:fillRef idx="1">
+            <a:schemeClr val="accent1"/>
+          </a:fillRef>
+          <a:effectRef idx="0">
+            <a:schemeClr val="accent1"/>
+          </a:effectRef>
+          <a:fontRef idx="minor">
+            <a:schemeClr val="lt1"/>
+          </a:fontRef>
+        </p:style>
+        <p:txBody>
+          <a:bodyPr/>
+          <a:lstStyle/>
+          <a:p>
+            <a:endParaRPr lang="en-US"/>
+          </a:p>
+        </p:txBody>
+      </p:sp>
+      <p:sp>
+        <p:nvSpPr>
+          <p:cNvPr id="10" name="Right Triangle 9"/>
+          <p:cNvSpPr/>
+          <p:nvPr/>
+        </p:nvSpPr>
+        <p:spPr>
+          <a:xfrm rot="19965684">
+            <a:off x="6403880" y="536480"/>
+            <a:ext cx="457200" cy="457200"/>
+          </a:xfrm>
+          <a:prstGeom prst="rtTriangle">
+            <a:avLst/>
+          </a:prstGeom>
+          <a:solidFill>
+            <a:schemeClr val="bg1">
+              <a:lumMod val="50000"/>
+            </a:schemeClr>
+          </a:solidFill>
+          <a:ln>
+            <a:solidFill>
+              <a:schemeClr val="tx1"/>
+            </a:solidFill>
+          </a:ln>
+        </p:spPr>
+        <p:style>
+          <a:lnRef idx="2">
+            <a:schemeClr val="accent1">
+              <a:shade val="50000"/>
+            </a:schemeClr>
+          </a:lnRef>
+          <a:fillRef idx="1">
+            <a:schemeClr val="accent1"/>
+          </a:fillRef>
+          <a:effectRef idx="0">
+            <a:schemeClr val="accent1"/>
+          </a:effectRef>
+          <a:fontRef idx="minor">
+            <a:schemeClr val="lt1"/>
+          </a:fontRef>
+        </p:style>
+        <p:txBody>
+          <a:bodyPr rtlCol="0" anchor="ctr"/>
+          <a:lstStyle/>
+          <a:p>
+            <a:pPr algn="ctr"/>
+            <a:endParaRPr lang="en-US"/>
+          </a:p>
+        </p:txBody>
+      </p:sp>
+      <p:sp>
+        <p:nvSpPr>
+          <p:cNvPr id="11" name="Right Triangle 10"/>
+          <p:cNvSpPr/>
+          <p:nvPr/>
+        </p:nvSpPr>
+        <p:spPr>
+          <a:xfrm rot="1634316" flipH="1">
+            <a:off x="5330920" y="662688"/>
+            <a:ext cx="457200" cy="457200"/>
+          </a:xfrm>
+          <a:prstGeom prst="rtTriangle">
+            <a:avLst/>
+          </a:prstGeom>
+          <a:solidFill>
+            <a:schemeClr val="bg1">
+              <a:lumMod val="50000"/>
+            </a:schemeClr>
+          </a:solidFill>
+          <a:ln>
+            <a:solidFill>
+              <a:schemeClr val="tx1"/>
+            </a:solidFill>
+          </a:ln>
+        </p:spPr>
+        <p:style>
+          <a:lnRef idx="2">
+            <a:schemeClr val="accent1">
+              <a:shade val="50000"/>
+            </a:schemeClr>
+          </a:lnRef>
+          <a:fillRef idx="1">
+            <a:schemeClr val="accent1"/>
+          </a:fillRef>
+          <a:effectRef idx="0">
+            <a:schemeClr val="accent1"/>
+          </a:effectRef>
+          <a:fontRef idx="minor">
+            <a:schemeClr val="lt1"/>
+          </a:fontRef>
+        </p:style>
+        <p:txBody>
+          <a:bodyPr rtlCol="0" anchor="ctr"/>
+          <a:lstStyle/>
+          <a:p>
+            <a:pPr algn="ctr"/>
+            <a:endParaRPr lang="en-US"/>
+          </a:p>
+        </p:txBody>
+      </p:sp>
+      <p:sp>
+        <p:nvSpPr>
+          <p:cNvPr id="12" name="Moon 11"/>
+          <p:cNvSpPr/>
+          <p:nvPr/>
+        </p:nvSpPr>
+        <p:spPr>
+          <a:xfrm rot="2252317" flipH="1">
+            <a:off x="4836343" y="2448724"/>
+            <a:ext cx="573624" cy="685835"/>
+          </a:xfrm>
+          <a:prstGeom prst="moon">
+            <a:avLst>
+              <a:gd name="adj" fmla="val 72647"/>
+            </a:avLst>
+          </a:prstGeom>
+          <a:solidFill>
+            <a:srgbClr val="FF0000"/>
+          </a:solidFill>
+          <a:ln>
+            <a:solidFill>
+              <a:schemeClr val="tx1"/>
+            </a:solidFill>
+          </a:ln>
+        </p:spPr>
+        <p:style>
+          <a:lnRef idx="2">
+            <a:schemeClr val="accent1">
+              <a:shade val="50000"/>
+            </a:schemeClr>
+          </a:lnRef>
+          <a:fillRef idx="1">
+            <a:schemeClr val="accent1"/>
+          </a:fillRef>
+          <a:effectRef idx="0">
+            <a:schemeClr val="accent1"/>
+          </a:effectRef>
+          <a:fontRef idx="minor">
+            <a:schemeClr val="lt1"/>
+          </a:fontRef>
+        </p:style>
+        <p:txBody>
+          <a:bodyPr/>
+          <a:lstStyle/>
+          <a:p>
+            <a:endParaRPr lang="en-US"/>
+          </a:p>
+        </p:txBody>
+      </p:sp>
+      <p:sp>
+        <p:nvSpPr>
+          <p:cNvPr id="13" name="Rectangle 12"/>
+          <p:cNvSpPr/>
+          <p:nvPr/>
+        </p:nvSpPr>
+        <p:spPr>
+          <a:xfrm>
+            <a:off x="609600" y="2362200"/>
+            <a:ext cx="990600" cy="838200"/>
+          </a:xfrm>
+          <a:prstGeom prst="rect">
+            <a:avLst/>
+          </a:prstGeom>
+          <a:solidFill>
+            <a:schemeClr val="bg1">
+              <a:lumMod val="85000"/>
+            </a:schemeClr>
+          </a:solidFill>
+          <a:ln>
+            <a:solidFill>
+              <a:schemeClr val="tx1"/>
+            </a:solidFill>
+          </a:ln>
+          <a:effectLst>
+            <a:outerShdw blurRad="50800" dist="38100" dir="2700000" algn="tl" rotWithShape="0">
+              <a:srgbClr val="000000">
+                <a:alpha val="43000"/>
+              </a:srgbClr>
+            </a:outerShdw>
+          </a:effectLst>
+        </p:spPr>
+        <p:style>
+          <a:lnRef idx="2">
+            <a:schemeClr val="accent1">
+              <a:shade val="50000"/>
+            </a:schemeClr>
+          </a:lnRef>
+          <a:fillRef idx="1">
+            <a:schemeClr val="accent1"/>
+          </a:fillRef>
+          <a:effectRef idx="0">
+            <a:schemeClr val="accent1"/>
+          </a:effectRef>
+          <a:fontRef idx="minor">
+            <a:schemeClr val="lt1"/>
+          </a:fontRef>
+        </p:style>
+        <p:txBody>
+          <a:bodyPr rtlCol="0" anchor="ctr"/>
+          <a:lstStyle/>
+          <a:p>
+            <a:pPr algn="ctr"/>
+            <a:endParaRPr lang="en-US"/>
+          </a:p>
+        </p:txBody>
+      </p:sp>
+      <p:sp>
+        <p:nvSpPr>
+          <p:cNvPr id="14" name="Rectangle 13"/>
+          <p:cNvSpPr/>
+          <p:nvPr/>
+        </p:nvSpPr>
+        <p:spPr>
+          <a:xfrm>
+            <a:off x="2133600" y="1752600"/>
+            <a:ext cx="1219200" cy="2057400"/>
+          </a:xfrm>
+          <a:prstGeom prst="rect">
+            <a:avLst/>
+          </a:prstGeom>
+          <a:solidFill>
+            <a:schemeClr val="bg1">
+              <a:lumMod val="85000"/>
+            </a:schemeClr>
+          </a:solidFill>
+          <a:ln>
+            <a:solidFill>
+              <a:schemeClr val="tx1"/>
+            </a:solidFill>
+          </a:ln>
+          <a:effectLst>
+            <a:outerShdw blurRad="50800" dist="38100" dir="2700000" algn="tl" rotWithShape="0">
+              <a:srgbClr val="000000">
+                <a:alpha val="43000"/>
+              </a:srgbClr>
+            </a:outerShdw>
+          </a:effectLst>
+        </p:spPr>
+        <p:style>
+          <a:lnRef idx="2">
+            <a:schemeClr val="accent1">
+              <a:shade val="50000"/>
+            </a:schemeClr>
+          </a:lnRef>
+          <a:fillRef idx="1">
+            <a:schemeClr val="accent1"/>
+          </a:fillRef>
+          <a:effectRef idx="0">
+            <a:schemeClr val="accent1"/>
+          </a:effectRef>
+          <a:fontRef idx="minor">
+            <a:schemeClr val="lt1"/>
+          </a:fontRef>
+        </p:style>
+        <p:txBody>
+          <a:bodyPr rtlCol="0" anchor="ctr"/>
+          <a:lstStyle/>
+          <a:p>
+            <a:pPr algn="ctr"/>
+            <a:endParaRPr lang="en-US"/>
+          </a:p>
+        </p:txBody>
+      </p:sp>
+    </p:spTree>
+    <p:extLst>
+      <p:ext uri="{BB962C8B-B14F-4D97-AF65-F5344CB8AC3E}">
+        <p14:creationId xmlns:p14="http://schemas.microsoft.com/office/powerpoint/2010/main" val="2712186541"/>
       </p:ext>
     </p:extLst>
   </p:cSld>

</xml_diff>